<commit_message>
Rosenberg - Updates to 4c, 30yr ppt and Method
</commit_message>
<xml_diff>
--- a/4 - Plots/Avg_annualFlows/WeberRiverFlows_30year_Selections.pptx
+++ b/4 - Plots/Avg_annualFlows/WeberRiverFlows_30year_Selections.pptx
@@ -507,7 +507,7 @@
           <a:p>
             <a:fld id="{BD8C7AAD-2B6D-4BCE-9765-5890B213691E}" type="datetimeFigureOut">
               <a:rPr lang="en-US" smtClean="0"/>
-              <a:t>2/23/2020</a:t>
+              <a:t>2/24/2020</a:t>
             </a:fld>
             <a:endParaRPr lang="en-US"/>
           </a:p>
@@ -677,7 +677,7 @@
           <a:p>
             <a:fld id="{BD8C7AAD-2B6D-4BCE-9765-5890B213691E}" type="datetimeFigureOut">
               <a:rPr lang="en-US" smtClean="0"/>
-              <a:t>2/23/2020</a:t>
+              <a:t>2/24/2020</a:t>
             </a:fld>
             <a:endParaRPr lang="en-US"/>
           </a:p>
@@ -857,7 +857,7 @@
           <a:p>
             <a:fld id="{BD8C7AAD-2B6D-4BCE-9765-5890B213691E}" type="datetimeFigureOut">
               <a:rPr lang="en-US" smtClean="0"/>
-              <a:t>2/23/2020</a:t>
+              <a:t>2/24/2020</a:t>
             </a:fld>
             <a:endParaRPr lang="en-US"/>
           </a:p>
@@ -1027,7 +1027,7 @@
           <a:p>
             <a:fld id="{BD8C7AAD-2B6D-4BCE-9765-5890B213691E}" type="datetimeFigureOut">
               <a:rPr lang="en-US" smtClean="0"/>
-              <a:t>2/23/2020</a:t>
+              <a:t>2/24/2020</a:t>
             </a:fld>
             <a:endParaRPr lang="en-US"/>
           </a:p>
@@ -1273,7 +1273,7 @@
           <a:p>
             <a:fld id="{BD8C7AAD-2B6D-4BCE-9765-5890B213691E}" type="datetimeFigureOut">
               <a:rPr lang="en-US" smtClean="0"/>
-              <a:t>2/23/2020</a:t>
+              <a:t>2/24/2020</a:t>
             </a:fld>
             <a:endParaRPr lang="en-US"/>
           </a:p>
@@ -1505,7 +1505,7 @@
           <a:p>
             <a:fld id="{BD8C7AAD-2B6D-4BCE-9765-5890B213691E}" type="datetimeFigureOut">
               <a:rPr lang="en-US" smtClean="0"/>
-              <a:t>2/23/2020</a:t>
+              <a:t>2/24/2020</a:t>
             </a:fld>
             <a:endParaRPr lang="en-US"/>
           </a:p>
@@ -1872,7 +1872,7 @@
           <a:p>
             <a:fld id="{BD8C7AAD-2B6D-4BCE-9765-5890B213691E}" type="datetimeFigureOut">
               <a:rPr lang="en-US" smtClean="0"/>
-              <a:t>2/23/2020</a:t>
+              <a:t>2/24/2020</a:t>
             </a:fld>
             <a:endParaRPr lang="en-US"/>
           </a:p>
@@ -1990,7 +1990,7 @@
           <a:p>
             <a:fld id="{BD8C7AAD-2B6D-4BCE-9765-5890B213691E}" type="datetimeFigureOut">
               <a:rPr lang="en-US" smtClean="0"/>
-              <a:t>2/23/2020</a:t>
+              <a:t>2/24/2020</a:t>
             </a:fld>
             <a:endParaRPr lang="en-US"/>
           </a:p>
@@ -2085,7 +2085,7 @@
           <a:p>
             <a:fld id="{BD8C7AAD-2B6D-4BCE-9765-5890B213691E}" type="datetimeFigureOut">
               <a:rPr lang="en-US" smtClean="0"/>
-              <a:t>2/23/2020</a:t>
+              <a:t>2/24/2020</a:t>
             </a:fld>
             <a:endParaRPr lang="en-US"/>
           </a:p>
@@ -2362,7 +2362,7 @@
           <a:p>
             <a:fld id="{BD8C7AAD-2B6D-4BCE-9765-5890B213691E}" type="datetimeFigureOut">
               <a:rPr lang="en-US" smtClean="0"/>
-              <a:t>2/23/2020</a:t>
+              <a:t>2/24/2020</a:t>
             </a:fld>
             <a:endParaRPr lang="en-US"/>
           </a:p>
@@ -2619,7 +2619,7 @@
           <a:p>
             <a:fld id="{BD8C7AAD-2B6D-4BCE-9765-5890B213691E}" type="datetimeFigureOut">
               <a:rPr lang="en-US" smtClean="0"/>
-              <a:t>2/23/2020</a:t>
+              <a:t>2/24/2020</a:t>
             </a:fld>
             <a:endParaRPr lang="en-US"/>
           </a:p>
@@ -2832,7 +2832,7 @@
           <a:p>
             <a:fld id="{BD8C7AAD-2B6D-4BCE-9765-5890B213691E}" type="datetimeFigureOut">
               <a:rPr lang="en-US" smtClean="0"/>
-              <a:t>2/23/2020</a:t>
+              <a:t>2/24/2020</a:t>
             </a:fld>
             <a:endParaRPr lang="en-US"/>
           </a:p>
@@ -3543,80 +3543,10 @@
       </p:pic>
       <p:sp>
         <p:nvSpPr>
-          <p:cNvPr id="2" name="Title 1">
+          <p:cNvPr id="14" name="Rectangle 13">
             <a:extLst>
               <a:ext uri="{FF2B5EF4-FFF2-40B4-BE49-F238E27FC236}">
-                <a16:creationId xmlns:a16="http://schemas.microsoft.com/office/drawing/2014/main" id="{7FC63040-953A-4757-AE5C-B374CA6DD5C8}"/>
-              </a:ext>
-            </a:extLst>
-          </p:cNvPr>
-          <p:cNvSpPr>
-            <a:spLocks noGrp="1"/>
-          </p:cNvSpPr>
-          <p:nvPr>
-            <p:ph type="title"/>
-          </p:nvPr>
-        </p:nvSpPr>
-        <p:spPr/>
-        <p:txBody>
-          <a:bodyPr/>
-          <a:lstStyle/>
-          <a:p>
-            <a:r>
-              <a:rPr lang="en-US" dirty="0"/>
-              <a:t>Weber at Oakley Annual Average </a:t>
-            </a:r>
-            <a:br>
-              <a:rPr lang="en-US" dirty="0"/>
-            </a:br>
-            <a:r>
-              <a:rPr lang="en-US" dirty="0"/>
-              <a:t>Flow 1429-2031</a:t>
-            </a:r>
-          </a:p>
-        </p:txBody>
-      </p:sp>
-      <p:sp>
-        <p:nvSpPr>
-          <p:cNvPr id="4" name="TextBox 3">
-            <a:extLst>
-              <a:ext uri="{FF2B5EF4-FFF2-40B4-BE49-F238E27FC236}">
-                <a16:creationId xmlns:a16="http://schemas.microsoft.com/office/drawing/2014/main" id="{C01843F2-E7F0-4EC3-BB15-2DDB1FFE38D8}"/>
-              </a:ext>
-            </a:extLst>
-          </p:cNvPr>
-          <p:cNvSpPr txBox="1"/>
-          <p:nvPr/>
-        </p:nvSpPr>
-        <p:spPr>
-          <a:xfrm>
-            <a:off x="8976739" y="930222"/>
-            <a:ext cx="1107833" cy="369332"/>
-          </a:xfrm>
-          <a:prstGeom prst="rect">
-            <a:avLst/>
-          </a:prstGeom>
-          <a:noFill/>
-        </p:spPr>
-        <p:txBody>
-          <a:bodyPr wrap="square" rtlCol="0">
-            <a:spAutoFit/>
-          </a:bodyPr>
-          <a:lstStyle/>
-          <a:p>
-            <a:r>
-              <a:rPr lang="en-US" dirty="0"/>
-              <a:t>Observed</a:t>
-            </a:r>
-          </a:p>
-        </p:txBody>
-      </p:sp>
-      <p:sp>
-        <p:nvSpPr>
-          <p:cNvPr id="6" name="Rectangle 5">
-            <a:extLst>
-              <a:ext uri="{FF2B5EF4-FFF2-40B4-BE49-F238E27FC236}">
-                <a16:creationId xmlns:a16="http://schemas.microsoft.com/office/drawing/2014/main" id="{C303D749-2668-45C3-8590-5AC545523536}"/>
+                <a16:creationId xmlns:a16="http://schemas.microsoft.com/office/drawing/2014/main" id="{365D3363-8D39-4421-98D2-827C18D63854}"/>
               </a:ext>
             </a:extLst>
           </p:cNvPr>
@@ -3625,8 +3555,8 @@
         </p:nvSpPr>
         <p:spPr>
           <a:xfrm>
-            <a:off x="9040954" y="962251"/>
-            <a:ext cx="959578" cy="295437"/>
+            <a:off x="8742035" y="1643049"/>
+            <a:ext cx="1740571" cy="4785087"/>
           </a:xfrm>
           <a:prstGeom prst="rect">
             <a:avLst/>
@@ -3669,10 +3599,10 @@
       </p:sp>
       <p:sp>
         <p:nvSpPr>
-          <p:cNvPr id="7" name="Rectangle 6">
+          <p:cNvPr id="18" name="Rectangle 17">
             <a:extLst>
               <a:ext uri="{FF2B5EF4-FFF2-40B4-BE49-F238E27FC236}">
-                <a16:creationId xmlns:a16="http://schemas.microsoft.com/office/drawing/2014/main" id="{6C79D0DE-5F0E-4996-8E5D-64140CFE68B9}"/>
+                <a16:creationId xmlns:a16="http://schemas.microsoft.com/office/drawing/2014/main" id="{D94BFB29-0CC4-46E3-AB10-E131CC98346C}"/>
               </a:ext>
             </a:extLst>
           </p:cNvPr>
@@ -3681,19 +3611,21 @@
         </p:nvSpPr>
         <p:spPr>
           <a:xfrm>
-            <a:off x="9040954" y="609373"/>
-            <a:ext cx="1817926" cy="295437"/>
+            <a:off x="9111523" y="1650781"/>
+            <a:ext cx="599883" cy="4785091"/>
           </a:xfrm>
           <a:prstGeom prst="rect">
             <a:avLst/>
           </a:prstGeom>
           <a:solidFill>
-            <a:srgbClr val="00B050">
+            <a:srgbClr val="00D450">
               <a:alpha val="20000"/>
             </a:srgbClr>
           </a:solidFill>
           <a:ln>
-            <a:noFill/>
+            <a:solidFill>
+              <a:schemeClr val="accent1"/>
+            </a:solidFill>
           </a:ln>
         </p:spPr>
         <p:style>
@@ -3717,226 +3649,16 @@
           <a:lstStyle/>
           <a:p>
             <a:pPr algn="ctr"/>
-            <a:endParaRPr lang="en-US" dirty="0"/>
-          </a:p>
-        </p:txBody>
-      </p:sp>
-      <p:sp>
-        <p:nvSpPr>
-          <p:cNvPr id="8" name="TextBox 7">
+            <a:endParaRPr lang="en-US" b="1" dirty="0"/>
+          </a:p>
+        </p:txBody>
+      </p:sp>
+      <p:sp>
+        <p:nvSpPr>
+          <p:cNvPr id="20" name="Rectangle 19">
             <a:extLst>
               <a:ext uri="{FF2B5EF4-FFF2-40B4-BE49-F238E27FC236}">
-                <a16:creationId xmlns:a16="http://schemas.microsoft.com/office/drawing/2014/main" id="{9501D648-D9FD-487A-BAA4-2D74C90D1358}"/>
-              </a:ext>
-            </a:extLst>
-          </p:cNvPr>
-          <p:cNvSpPr txBox="1"/>
-          <p:nvPr/>
-        </p:nvSpPr>
-        <p:spPr>
-          <a:xfrm>
-            <a:off x="8976739" y="605163"/>
-            <a:ext cx="2584183" cy="369332"/>
-          </a:xfrm>
-          <a:prstGeom prst="rect">
-            <a:avLst/>
-          </a:prstGeom>
-          <a:noFill/>
-        </p:spPr>
-        <p:txBody>
-          <a:bodyPr wrap="square" rtlCol="0">
-            <a:spAutoFit/>
-          </a:bodyPr>
-          <a:lstStyle/>
-          <a:p>
-            <a:r>
-              <a:rPr lang="en-US" dirty="0"/>
-              <a:t>Selected Scenarios</a:t>
-            </a:r>
-          </a:p>
-        </p:txBody>
-      </p:sp>
-      <p:sp>
-        <p:nvSpPr>
-          <p:cNvPr id="9" name="TextBox 8">
-            <a:extLst>
-              <a:ext uri="{FF2B5EF4-FFF2-40B4-BE49-F238E27FC236}">
-                <a16:creationId xmlns:a16="http://schemas.microsoft.com/office/drawing/2014/main" id="{A946DACF-8F19-4F1B-A129-2B6D4AF7D06D}"/>
-              </a:ext>
-            </a:extLst>
-          </p:cNvPr>
-          <p:cNvSpPr txBox="1"/>
-          <p:nvPr/>
-        </p:nvSpPr>
-        <p:spPr>
-          <a:xfrm>
-            <a:off x="3810633" y="1690688"/>
-            <a:ext cx="720182" cy="400110"/>
-          </a:xfrm>
-          <a:prstGeom prst="rect">
-            <a:avLst/>
-          </a:prstGeom>
-          <a:noFill/>
-        </p:spPr>
-        <p:txBody>
-          <a:bodyPr wrap="square" rtlCol="0">
-            <a:spAutoFit/>
-          </a:bodyPr>
-          <a:lstStyle/>
-          <a:p>
-            <a:r>
-              <a:rPr lang="en-US" sz="1000" dirty="0"/>
-              <a:t>1570-1600</a:t>
-            </a:r>
-          </a:p>
-        </p:txBody>
-      </p:sp>
-      <p:sp>
-        <p:nvSpPr>
-          <p:cNvPr id="10" name="TextBox 9">
-            <a:extLst>
-              <a:ext uri="{FF2B5EF4-FFF2-40B4-BE49-F238E27FC236}">
-                <a16:creationId xmlns:a16="http://schemas.microsoft.com/office/drawing/2014/main" id="{12E30EB9-2C46-42A0-8AFC-7E664231A7AD}"/>
-              </a:ext>
-            </a:extLst>
-          </p:cNvPr>
-          <p:cNvSpPr txBox="1"/>
-          <p:nvPr/>
-        </p:nvSpPr>
-        <p:spPr>
-          <a:xfrm>
-            <a:off x="2972623" y="1699740"/>
-            <a:ext cx="527701" cy="400110"/>
-          </a:xfrm>
-          <a:prstGeom prst="rect">
-            <a:avLst/>
-          </a:prstGeom>
-          <a:noFill/>
-        </p:spPr>
-        <p:txBody>
-          <a:bodyPr wrap="square" rtlCol="0">
-            <a:spAutoFit/>
-          </a:bodyPr>
-          <a:lstStyle/>
-          <a:p>
-            <a:r>
-              <a:rPr lang="en-US" sz="1000" dirty="0"/>
-              <a:t>1520-1550</a:t>
-            </a:r>
-          </a:p>
-        </p:txBody>
-      </p:sp>
-      <p:sp>
-        <p:nvSpPr>
-          <p:cNvPr id="11" name="TextBox 10">
-            <a:extLst>
-              <a:ext uri="{FF2B5EF4-FFF2-40B4-BE49-F238E27FC236}">
-                <a16:creationId xmlns:a16="http://schemas.microsoft.com/office/drawing/2014/main" id="{FA260F27-F103-4671-9B9E-353597EC444B}"/>
-              </a:ext>
-            </a:extLst>
-          </p:cNvPr>
-          <p:cNvSpPr txBox="1"/>
-          <p:nvPr/>
-        </p:nvSpPr>
-        <p:spPr>
-          <a:xfrm>
-            <a:off x="4536142" y="1683977"/>
-            <a:ext cx="720182" cy="400110"/>
-          </a:xfrm>
-          <a:prstGeom prst="rect">
-            <a:avLst/>
-          </a:prstGeom>
-          <a:noFill/>
-        </p:spPr>
-        <p:txBody>
-          <a:bodyPr wrap="square" rtlCol="0">
-            <a:spAutoFit/>
-          </a:bodyPr>
-          <a:lstStyle/>
-          <a:p>
-            <a:r>
-              <a:rPr lang="en-US" sz="1000" dirty="0"/>
-              <a:t>1610- 1640</a:t>
-            </a:r>
-          </a:p>
-        </p:txBody>
-      </p:sp>
-      <p:sp>
-        <p:nvSpPr>
-          <p:cNvPr id="12" name="TextBox 11">
-            <a:extLst>
-              <a:ext uri="{FF2B5EF4-FFF2-40B4-BE49-F238E27FC236}">
-                <a16:creationId xmlns:a16="http://schemas.microsoft.com/office/drawing/2014/main" id="{71794943-E4D5-4B01-8696-159E8BFF6638}"/>
-              </a:ext>
-            </a:extLst>
-          </p:cNvPr>
-          <p:cNvSpPr txBox="1"/>
-          <p:nvPr/>
-        </p:nvSpPr>
-        <p:spPr>
-          <a:xfrm>
-            <a:off x="9127271" y="1683977"/>
-            <a:ext cx="571249" cy="400110"/>
-          </a:xfrm>
-          <a:prstGeom prst="rect">
-            <a:avLst/>
-          </a:prstGeom>
-          <a:noFill/>
-        </p:spPr>
-        <p:txBody>
-          <a:bodyPr wrap="square" rtlCol="0">
-            <a:spAutoFit/>
-          </a:bodyPr>
-          <a:lstStyle/>
-          <a:p>
-            <a:r>
-              <a:rPr lang="en-US" sz="1000" dirty="0"/>
-              <a:t>1930-1960</a:t>
-            </a:r>
-          </a:p>
-        </p:txBody>
-      </p:sp>
-      <p:sp>
-        <p:nvSpPr>
-          <p:cNvPr id="13" name="TextBox 12">
-            <a:extLst>
-              <a:ext uri="{FF2B5EF4-FFF2-40B4-BE49-F238E27FC236}">
-                <a16:creationId xmlns:a16="http://schemas.microsoft.com/office/drawing/2014/main" id="{2813DCD2-FA44-42FA-BAA4-D3E3F951A4B5}"/>
-              </a:ext>
-            </a:extLst>
-          </p:cNvPr>
-          <p:cNvSpPr txBox="1"/>
-          <p:nvPr/>
-        </p:nvSpPr>
-        <p:spPr>
-          <a:xfrm>
-            <a:off x="9467080" y="1687333"/>
-            <a:ext cx="482837" cy="400110"/>
-          </a:xfrm>
-          <a:prstGeom prst="rect">
-            <a:avLst/>
-          </a:prstGeom>
-          <a:noFill/>
-        </p:spPr>
-        <p:txBody>
-          <a:bodyPr wrap="square" rtlCol="0">
-            <a:spAutoFit/>
-          </a:bodyPr>
-          <a:lstStyle/>
-          <a:p>
-            <a:r>
-              <a:rPr lang="en-US" sz="1000" dirty="0"/>
-              <a:t>1940- 1970</a:t>
-            </a:r>
-          </a:p>
-        </p:txBody>
-      </p:sp>
-      <p:sp>
-        <p:nvSpPr>
-          <p:cNvPr id="14" name="Rectangle 13">
-            <a:extLst>
-              <a:ext uri="{FF2B5EF4-FFF2-40B4-BE49-F238E27FC236}">
-                <a16:creationId xmlns:a16="http://schemas.microsoft.com/office/drawing/2014/main" id="{365D3363-8D39-4421-98D2-827C18D63854}"/>
+                <a16:creationId xmlns:a16="http://schemas.microsoft.com/office/drawing/2014/main" id="{99384DFD-0638-4E9D-906B-201A3CD7AF3E}"/>
               </a:ext>
             </a:extLst>
           </p:cNvPr>
@@ -3945,18 +3667,16 @@
         </p:nvSpPr>
         <p:spPr>
           <a:xfrm>
-            <a:off x="8748713" y="1650789"/>
-            <a:ext cx="1381876" cy="4785087"/>
+            <a:off x="10268831" y="1662375"/>
+            <a:ext cx="684919" cy="4773497"/>
           </a:xfrm>
           <a:prstGeom prst="rect">
             <a:avLst/>
           </a:prstGeom>
           <a:solidFill>
-            <a:schemeClr val="accent4">
-              <a:lumMod val="20000"/>
-              <a:lumOff val="80000"/>
+            <a:srgbClr val="00B050">
               <a:alpha val="20000"/>
-            </a:schemeClr>
+            </a:srgbClr>
           </a:solidFill>
           <a:ln>
             <a:noFill/>
@@ -3989,10 +3709,10 @@
       </p:sp>
       <p:sp>
         <p:nvSpPr>
-          <p:cNvPr id="15" name="Rectangle 14">
+          <p:cNvPr id="19" name="Rectangle 18">
             <a:extLst>
               <a:ext uri="{FF2B5EF4-FFF2-40B4-BE49-F238E27FC236}">
-                <a16:creationId xmlns:a16="http://schemas.microsoft.com/office/drawing/2014/main" id="{47FB7F82-BA40-46A3-8342-B2E10B5B4DD2}"/>
+                <a16:creationId xmlns:a16="http://schemas.microsoft.com/office/drawing/2014/main" id="{15063E19-01E7-4D84-AC25-D151BEB030AD}"/>
               </a:ext>
             </a:extLst>
           </p:cNvPr>
@@ -4001,19 +3721,21 @@
         </p:nvSpPr>
         <p:spPr>
           <a:xfrm>
-            <a:off x="2946374" y="1662376"/>
-            <a:ext cx="600376" cy="4785086"/>
+            <a:off x="9291317" y="1662375"/>
+            <a:ext cx="599884" cy="4765764"/>
           </a:xfrm>
           <a:prstGeom prst="rect">
             <a:avLst/>
           </a:prstGeom>
           <a:solidFill>
-            <a:srgbClr val="00B050">
+            <a:srgbClr val="009550">
               <a:alpha val="20000"/>
             </a:srgbClr>
           </a:solidFill>
           <a:ln>
-            <a:noFill/>
+            <a:solidFill>
+              <a:schemeClr val="accent1"/>
+            </a:solidFill>
           </a:ln>
         </p:spPr>
         <p:style>
@@ -4043,10 +3765,10 @@
       </p:sp>
       <p:sp>
         <p:nvSpPr>
-          <p:cNvPr id="16" name="Rectangle 15">
+          <p:cNvPr id="17" name="Rectangle 16">
             <a:extLst>
               <a:ext uri="{FF2B5EF4-FFF2-40B4-BE49-F238E27FC236}">
-                <a16:creationId xmlns:a16="http://schemas.microsoft.com/office/drawing/2014/main" id="{B1F01043-631E-4385-B958-DCAC2179535B}"/>
+                <a16:creationId xmlns:a16="http://schemas.microsoft.com/office/drawing/2014/main" id="{CEABE188-7284-4D51-8DB3-16ED06BF88ED}"/>
               </a:ext>
             </a:extLst>
           </p:cNvPr>
@@ -4055,8 +3777,8 @@
         </p:nvSpPr>
         <p:spPr>
           <a:xfrm>
-            <a:off x="3750219" y="1662377"/>
-            <a:ext cx="599883" cy="4773497"/>
+            <a:off x="4520776" y="1650781"/>
+            <a:ext cx="593831" cy="4777355"/>
           </a:xfrm>
           <a:prstGeom prst="rect">
             <a:avLst/>
@@ -4097,10 +3819,10 @@
       </p:sp>
       <p:sp>
         <p:nvSpPr>
-          <p:cNvPr id="17" name="Rectangle 16">
+          <p:cNvPr id="16" name="Rectangle 15">
             <a:extLst>
               <a:ext uri="{FF2B5EF4-FFF2-40B4-BE49-F238E27FC236}">
-                <a16:creationId xmlns:a16="http://schemas.microsoft.com/office/drawing/2014/main" id="{CEABE188-7284-4D51-8DB3-16ED06BF88ED}"/>
+                <a16:creationId xmlns:a16="http://schemas.microsoft.com/office/drawing/2014/main" id="{B1F01043-631E-4385-B958-DCAC2179535B}"/>
               </a:ext>
             </a:extLst>
           </p:cNvPr>
@@ -4109,8 +3831,8 @@
         </p:nvSpPr>
         <p:spPr>
           <a:xfrm>
-            <a:off x="4505091" y="1662375"/>
-            <a:ext cx="593831" cy="4785087"/>
+            <a:off x="3750219" y="1662377"/>
+            <a:ext cx="599883" cy="4773497"/>
           </a:xfrm>
           <a:prstGeom prst="rect">
             <a:avLst/>
@@ -4151,10 +3873,10 @@
       </p:sp>
       <p:sp>
         <p:nvSpPr>
-          <p:cNvPr id="18" name="Rectangle 17">
+          <p:cNvPr id="15" name="Rectangle 14">
             <a:extLst>
               <a:ext uri="{FF2B5EF4-FFF2-40B4-BE49-F238E27FC236}">
-                <a16:creationId xmlns:a16="http://schemas.microsoft.com/office/drawing/2014/main" id="{D94BFB29-0CC4-46E3-AB10-E131CC98346C}"/>
+                <a16:creationId xmlns:a16="http://schemas.microsoft.com/office/drawing/2014/main" id="{47FB7F82-BA40-46A3-8342-B2E10B5B4DD2}"/>
               </a:ext>
             </a:extLst>
           </p:cNvPr>
@@ -4163,14 +3885,14 @@
         </p:nvSpPr>
         <p:spPr>
           <a:xfrm>
-            <a:off x="9111523" y="1650781"/>
-            <a:ext cx="599883" cy="4785091"/>
+            <a:off x="2946374" y="1662376"/>
+            <a:ext cx="600376" cy="4785086"/>
           </a:xfrm>
           <a:prstGeom prst="rect">
             <a:avLst/>
           </a:prstGeom>
           <a:solidFill>
-            <a:srgbClr val="00D450">
+            <a:srgbClr val="00B050">
               <a:alpha val="20000"/>
             </a:srgbClr>
           </a:solidFill>
@@ -4205,10 +3927,268 @@
       </p:sp>
       <p:sp>
         <p:nvSpPr>
-          <p:cNvPr id="19" name="Rectangle 18">
+          <p:cNvPr id="4" name="TextBox 3">
             <a:extLst>
               <a:ext uri="{FF2B5EF4-FFF2-40B4-BE49-F238E27FC236}">
-                <a16:creationId xmlns:a16="http://schemas.microsoft.com/office/drawing/2014/main" id="{15063E19-01E7-4D84-AC25-D151BEB030AD}"/>
+                <a16:creationId xmlns:a16="http://schemas.microsoft.com/office/drawing/2014/main" id="{C01843F2-E7F0-4EC3-BB15-2DDB1FFE38D8}"/>
+              </a:ext>
+            </a:extLst>
+          </p:cNvPr>
+          <p:cNvSpPr txBox="1"/>
+          <p:nvPr/>
+        </p:nvSpPr>
+        <p:spPr>
+          <a:xfrm>
+            <a:off x="8742035" y="1158339"/>
+            <a:ext cx="2579546" cy="369332"/>
+          </a:xfrm>
+          <a:prstGeom prst="rect">
+            <a:avLst/>
+          </a:prstGeom>
+          <a:solidFill>
+            <a:schemeClr val="accent4">
+              <a:lumMod val="20000"/>
+              <a:lumOff val="80000"/>
+              <a:alpha val="20000"/>
+            </a:schemeClr>
+          </a:solidFill>
+        </p:spPr>
+        <p:txBody>
+          <a:bodyPr wrap="square" rtlCol="0">
+            <a:spAutoFit/>
+          </a:bodyPr>
+          <a:lstStyle/>
+          <a:p>
+            <a:r>
+              <a:rPr lang="en-US" dirty="0"/>
+              <a:t>Observed (1900 to 2010)</a:t>
+            </a:r>
+          </a:p>
+        </p:txBody>
+      </p:sp>
+      <p:sp>
+        <p:nvSpPr>
+          <p:cNvPr id="8" name="TextBox 7">
+            <a:extLst>
+              <a:ext uri="{FF2B5EF4-FFF2-40B4-BE49-F238E27FC236}">
+                <a16:creationId xmlns:a16="http://schemas.microsoft.com/office/drawing/2014/main" id="{9501D648-D9FD-487A-BAA4-2D74C90D1358}"/>
+              </a:ext>
+            </a:extLst>
+          </p:cNvPr>
+          <p:cNvSpPr txBox="1"/>
+          <p:nvPr/>
+        </p:nvSpPr>
+        <p:spPr>
+          <a:xfrm>
+            <a:off x="8742035" y="770150"/>
+            <a:ext cx="2584183" cy="369332"/>
+          </a:xfrm>
+          <a:prstGeom prst="rect">
+            <a:avLst/>
+          </a:prstGeom>
+          <a:solidFill>
+            <a:srgbClr val="00B050">
+              <a:alpha val="20000"/>
+            </a:srgbClr>
+          </a:solidFill>
+        </p:spPr>
+        <p:txBody>
+          <a:bodyPr wrap="square" rtlCol="0">
+            <a:spAutoFit/>
+          </a:bodyPr>
+          <a:lstStyle/>
+          <a:p>
+            <a:r>
+              <a:rPr lang="en-US" dirty="0"/>
+              <a:t>Selected Scenarios</a:t>
+            </a:r>
+          </a:p>
+        </p:txBody>
+      </p:sp>
+      <p:sp>
+        <p:nvSpPr>
+          <p:cNvPr id="9" name="TextBox 8">
+            <a:extLst>
+              <a:ext uri="{FF2B5EF4-FFF2-40B4-BE49-F238E27FC236}">
+                <a16:creationId xmlns:a16="http://schemas.microsoft.com/office/drawing/2014/main" id="{A946DACF-8F19-4F1B-A129-2B6D4AF7D06D}"/>
+              </a:ext>
+            </a:extLst>
+          </p:cNvPr>
+          <p:cNvSpPr txBox="1"/>
+          <p:nvPr/>
+        </p:nvSpPr>
+        <p:spPr>
+          <a:xfrm>
+            <a:off x="3664618" y="1690688"/>
+            <a:ext cx="782063" cy="246221"/>
+          </a:xfrm>
+          <a:prstGeom prst="rect">
+            <a:avLst/>
+          </a:prstGeom>
+          <a:noFill/>
+        </p:spPr>
+        <p:txBody>
+          <a:bodyPr wrap="square" rtlCol="0">
+            <a:spAutoFit/>
+          </a:bodyPr>
+          <a:lstStyle/>
+          <a:p>
+            <a:pPr algn="ctr"/>
+            <a:r>
+              <a:rPr lang="en-US" sz="1000" b="1" dirty="0"/>
+              <a:t>1570-1600</a:t>
+            </a:r>
+          </a:p>
+        </p:txBody>
+      </p:sp>
+      <p:sp>
+        <p:nvSpPr>
+          <p:cNvPr id="10" name="TextBox 9">
+            <a:extLst>
+              <a:ext uri="{FF2B5EF4-FFF2-40B4-BE49-F238E27FC236}">
+                <a16:creationId xmlns:a16="http://schemas.microsoft.com/office/drawing/2014/main" id="{12E30EB9-2C46-42A0-8AFC-7E664231A7AD}"/>
+              </a:ext>
+            </a:extLst>
+          </p:cNvPr>
+          <p:cNvSpPr txBox="1"/>
+          <p:nvPr/>
+        </p:nvSpPr>
+        <p:spPr>
+          <a:xfrm>
+            <a:off x="2865778" y="1699931"/>
+            <a:ext cx="757419" cy="246221"/>
+          </a:xfrm>
+          <a:prstGeom prst="rect">
+            <a:avLst/>
+          </a:prstGeom>
+          <a:noFill/>
+        </p:spPr>
+        <p:txBody>
+          <a:bodyPr wrap="square" rtlCol="0">
+            <a:spAutoFit/>
+          </a:bodyPr>
+          <a:lstStyle/>
+          <a:p>
+            <a:r>
+              <a:rPr lang="en-US" sz="1000" b="1" dirty="0"/>
+              <a:t>1520-1550</a:t>
+            </a:r>
+          </a:p>
+        </p:txBody>
+      </p:sp>
+      <p:sp>
+        <p:nvSpPr>
+          <p:cNvPr id="12" name="TextBox 11">
+            <a:extLst>
+              <a:ext uri="{FF2B5EF4-FFF2-40B4-BE49-F238E27FC236}">
+                <a16:creationId xmlns:a16="http://schemas.microsoft.com/office/drawing/2014/main" id="{71794943-E4D5-4B01-8696-159E8BFF6638}"/>
+              </a:ext>
+            </a:extLst>
+          </p:cNvPr>
+          <p:cNvSpPr txBox="1"/>
+          <p:nvPr/>
+        </p:nvSpPr>
+        <p:spPr>
+          <a:xfrm>
+            <a:off x="9040954" y="1853703"/>
+            <a:ext cx="800492" cy="246221"/>
+          </a:xfrm>
+          <a:prstGeom prst="rect">
+            <a:avLst/>
+          </a:prstGeom>
+          <a:noFill/>
+        </p:spPr>
+        <p:txBody>
+          <a:bodyPr wrap="square" rtlCol="0">
+            <a:spAutoFit/>
+          </a:bodyPr>
+          <a:lstStyle/>
+          <a:p>
+            <a:r>
+              <a:rPr lang="en-US" sz="1000" b="1" dirty="0"/>
+              <a:t>1930-1960</a:t>
+            </a:r>
+          </a:p>
+        </p:txBody>
+      </p:sp>
+      <p:sp>
+        <p:nvSpPr>
+          <p:cNvPr id="13" name="TextBox 12">
+            <a:extLst>
+              <a:ext uri="{FF2B5EF4-FFF2-40B4-BE49-F238E27FC236}">
+                <a16:creationId xmlns:a16="http://schemas.microsoft.com/office/drawing/2014/main" id="{2813DCD2-FA44-42FA-BAA4-D3E3F951A4B5}"/>
+              </a:ext>
+            </a:extLst>
+          </p:cNvPr>
+          <p:cNvSpPr txBox="1"/>
+          <p:nvPr/>
+        </p:nvSpPr>
+        <p:spPr>
+          <a:xfrm>
+            <a:off x="9220697" y="1690687"/>
+            <a:ext cx="800492" cy="246221"/>
+          </a:xfrm>
+          <a:prstGeom prst="rect">
+            <a:avLst/>
+          </a:prstGeom>
+          <a:noFill/>
+        </p:spPr>
+        <p:txBody>
+          <a:bodyPr wrap="square" rtlCol="0">
+            <a:spAutoFit/>
+          </a:bodyPr>
+          <a:lstStyle/>
+          <a:p>
+            <a:pPr algn="ctr"/>
+            <a:r>
+              <a:rPr lang="en-US" sz="1000" b="1" dirty="0"/>
+              <a:t>1940-1970</a:t>
+            </a:r>
+          </a:p>
+        </p:txBody>
+      </p:sp>
+      <p:sp>
+        <p:nvSpPr>
+          <p:cNvPr id="3" name="TextBox 2">
+            <a:extLst>
+              <a:ext uri="{FF2B5EF4-FFF2-40B4-BE49-F238E27FC236}">
+                <a16:creationId xmlns:a16="http://schemas.microsoft.com/office/drawing/2014/main" id="{45181FC1-6E85-4CFD-B404-B025CC40322A}"/>
+              </a:ext>
+            </a:extLst>
+          </p:cNvPr>
+          <p:cNvSpPr txBox="1"/>
+          <p:nvPr/>
+        </p:nvSpPr>
+        <p:spPr>
+          <a:xfrm>
+            <a:off x="10219142" y="1692514"/>
+            <a:ext cx="824262" cy="246221"/>
+          </a:xfrm>
+          <a:prstGeom prst="rect">
+            <a:avLst/>
+          </a:prstGeom>
+          <a:noFill/>
+        </p:spPr>
+        <p:txBody>
+          <a:bodyPr wrap="square" rtlCol="0">
+            <a:spAutoFit/>
+          </a:bodyPr>
+          <a:lstStyle/>
+          <a:p>
+            <a:pPr algn="ctr"/>
+            <a:r>
+              <a:rPr lang="en-US" sz="1000" b="1" dirty="0"/>
+              <a:t>Hot Dry</a:t>
+            </a:r>
+          </a:p>
+        </p:txBody>
+      </p:sp>
+      <p:sp>
+        <p:nvSpPr>
+          <p:cNvPr id="21" name="Rectangle 20">
+            <a:extLst>
+              <a:ext uri="{FF2B5EF4-FFF2-40B4-BE49-F238E27FC236}">
+                <a16:creationId xmlns:a16="http://schemas.microsoft.com/office/drawing/2014/main" id="{F8FE3FEE-42A8-4997-9D07-79D70389A071}"/>
               </a:ext>
             </a:extLst>
           </p:cNvPr>
@@ -4217,16 +4197,14 @@
         </p:nvSpPr>
         <p:spPr>
           <a:xfrm>
-            <a:off x="9263483" y="1650785"/>
-            <a:ext cx="599884" cy="4785091"/>
+            <a:off x="5021404" y="1308798"/>
+            <a:ext cx="2579546" cy="281878"/>
           </a:xfrm>
           <a:prstGeom prst="rect">
             <a:avLst/>
           </a:prstGeom>
           <a:solidFill>
-            <a:srgbClr val="009550">
-              <a:alpha val="20000"/>
-            </a:srgbClr>
+            <a:schemeClr val="bg1"/>
           </a:solidFill>
           <a:ln>
             <a:noFill/>
@@ -4259,64 +4237,10 @@
       </p:sp>
       <p:sp>
         <p:nvSpPr>
-          <p:cNvPr id="20" name="Rectangle 19">
+          <p:cNvPr id="11" name="TextBox 10">
             <a:extLst>
               <a:ext uri="{FF2B5EF4-FFF2-40B4-BE49-F238E27FC236}">
-                <a16:creationId xmlns:a16="http://schemas.microsoft.com/office/drawing/2014/main" id="{99384DFD-0638-4E9D-906B-201A3CD7AF3E}"/>
-              </a:ext>
-            </a:extLst>
-          </p:cNvPr>
-          <p:cNvSpPr/>
-          <p:nvPr/>
-        </p:nvSpPr>
-        <p:spPr>
-          <a:xfrm>
-            <a:off x="10268831" y="1662375"/>
-            <a:ext cx="684919" cy="4773497"/>
-          </a:xfrm>
-          <a:prstGeom prst="rect">
-            <a:avLst/>
-          </a:prstGeom>
-          <a:solidFill>
-            <a:srgbClr val="00B050">
-              <a:alpha val="20000"/>
-            </a:srgbClr>
-          </a:solidFill>
-          <a:ln>
-            <a:noFill/>
-          </a:ln>
-        </p:spPr>
-        <p:style>
-          <a:lnRef idx="2">
-            <a:schemeClr val="accent1">
-              <a:shade val="50000"/>
-            </a:schemeClr>
-          </a:lnRef>
-          <a:fillRef idx="1">
-            <a:schemeClr val="accent1"/>
-          </a:fillRef>
-          <a:effectRef idx="0">
-            <a:schemeClr val="accent1"/>
-          </a:effectRef>
-          <a:fontRef idx="minor">
-            <a:schemeClr val="lt1"/>
-          </a:fontRef>
-        </p:style>
-        <p:txBody>
-          <a:bodyPr rtlCol="0" anchor="ctr"/>
-          <a:lstStyle/>
-          <a:p>
-            <a:pPr algn="ctr"/>
-            <a:endParaRPr lang="en-US" dirty="0"/>
-          </a:p>
-        </p:txBody>
-      </p:sp>
-      <p:sp>
-        <p:nvSpPr>
-          <p:cNvPr id="3" name="TextBox 2">
-            <a:extLst>
-              <a:ext uri="{FF2B5EF4-FFF2-40B4-BE49-F238E27FC236}">
-                <a16:creationId xmlns:a16="http://schemas.microsoft.com/office/drawing/2014/main" id="{45181FC1-6E85-4CFD-B404-B025CC40322A}"/>
+                <a16:creationId xmlns:a16="http://schemas.microsoft.com/office/drawing/2014/main" id="{FA260F27-F103-4671-9B9E-353597EC444B}"/>
               </a:ext>
             </a:extLst>
           </p:cNvPr>
@@ -4325,8 +4249,8 @@
         </p:nvSpPr>
         <p:spPr>
           <a:xfrm>
-            <a:off x="10382501" y="1669153"/>
-            <a:ext cx="571249" cy="400110"/>
+            <a:off x="4459567" y="1692514"/>
+            <a:ext cx="782062" cy="246221"/>
           </a:xfrm>
           <a:prstGeom prst="rect">
             <a:avLst/>
@@ -4340,34 +4264,28 @@
           <a:lstStyle/>
           <a:p>
             <a:r>
-              <a:rPr lang="en-US" sz="1000" dirty="0"/>
-              <a:t>2002- </a:t>
-            </a:r>
-          </a:p>
-          <a:p>
-            <a:r>
-              <a:rPr lang="en-US" sz="1000" dirty="0"/>
-              <a:t>2031</a:t>
-            </a:r>
-          </a:p>
-        </p:txBody>
-      </p:sp>
-      <p:sp>
-        <p:nvSpPr>
-          <p:cNvPr id="21" name="Rectangle 20">
+              <a:rPr lang="en-US" sz="1000" b="1" dirty="0"/>
+              <a:t>1610-1640</a:t>
+            </a:r>
+          </a:p>
+        </p:txBody>
+      </p:sp>
+      <p:sp>
+        <p:nvSpPr>
+          <p:cNvPr id="24" name="TextBox 23">
             <a:extLst>
               <a:ext uri="{FF2B5EF4-FFF2-40B4-BE49-F238E27FC236}">
-                <a16:creationId xmlns:a16="http://schemas.microsoft.com/office/drawing/2014/main" id="{F8FE3FEE-42A8-4997-9D07-79D70389A071}"/>
+                <a16:creationId xmlns:a16="http://schemas.microsoft.com/office/drawing/2014/main" id="{1F1891D8-A07D-451C-8B00-A4CBFB5523D0}"/>
               </a:ext>
             </a:extLst>
           </p:cNvPr>
-          <p:cNvSpPr/>
+          <p:cNvSpPr txBox="1"/>
           <p:nvPr/>
         </p:nvSpPr>
         <p:spPr>
-          <a:xfrm>
-            <a:off x="5021404" y="1308798"/>
-            <a:ext cx="2579546" cy="281878"/>
+          <a:xfrm rot="16200000">
+            <a:off x="-735203" y="3681964"/>
+            <a:ext cx="2852871" cy="646331"/>
           </a:xfrm>
           <a:prstGeom prst="rect">
             <a:avLst/>
@@ -4375,32 +4293,25 @@
           <a:solidFill>
             <a:schemeClr val="bg1"/>
           </a:solidFill>
-          <a:ln>
-            <a:noFill/>
-          </a:ln>
-        </p:spPr>
-        <p:style>
-          <a:lnRef idx="2">
-            <a:schemeClr val="accent1">
-              <a:shade val="50000"/>
-            </a:schemeClr>
-          </a:lnRef>
-          <a:fillRef idx="1">
-            <a:schemeClr val="accent1"/>
-          </a:fillRef>
-          <a:effectRef idx="0">
-            <a:schemeClr val="accent1"/>
-          </a:effectRef>
-          <a:fontRef idx="minor">
-            <a:schemeClr val="lt1"/>
-          </a:fontRef>
-        </p:style>
-        <p:txBody>
-          <a:bodyPr rtlCol="0" anchor="ctr"/>
+        </p:spPr>
+        <p:txBody>
+          <a:bodyPr wrap="square" rtlCol="0">
+            <a:spAutoFit/>
+          </a:bodyPr>
           <a:lstStyle/>
           <a:p>
             <a:pPr algn="ctr"/>
-            <a:endParaRPr lang="en-US" dirty="0"/>
+            <a:r>
+              <a:rPr lang="en-US" b="1" dirty="0"/>
+              <a:t>Weber River Flow at Oakley</a:t>
+            </a:r>
+          </a:p>
+          <a:p>
+            <a:pPr algn="ctr"/>
+            <a:r>
+              <a:rPr lang="en-US" b="1" dirty="0"/>
+              <a:t>(acre-feet per year)</a:t>
+            </a:r>
           </a:p>
         </p:txBody>
       </p:sp>

</xml_diff>